<commit_message>
last on this repository
</commit_message>
<xml_diff>
--- a/PiAndMore/UK---English/Part-1--Breadboard/PiAndMore workshop physical computing with Arduino - part 1 - Intermediate.v0.15.pptx
+++ b/PiAndMore/UK---English/Part-1--Breadboard/PiAndMore workshop physical computing with Arduino - part 1 - Intermediate.v0.15.pptx
@@ -302,7 +302,7 @@
             <a:fld id="{DB6A203D-5BB1-439B-9A8B-0C4974EC0C08}" type="datetimeFigureOut">
               <a:rPr lang="nl-NL" smtClean="0"/>
               <a:pPr/>
-              <a:t>7-2-2018</a:t>
+              <a:t>8-2-2018</a:t>
             </a:fld>
             <a:endParaRPr lang="nl-NL"/>
           </a:p>
@@ -11901,7 +11901,23 @@
             </a:pPr>
             <a:r>
               <a:rPr lang="en-US" dirty="0" smtClean="0"/>
-              <a:t>By modulating (changing) the pulse width, the amount of energy fed to the e.g. LED is changed, and hence the intensity with which you see it lighting.</a:t>
+              <a:t>By modulating (changing) the pulse width, the amount of energy fed to </a:t>
+            </a:r>
+            <a:r>
+              <a:rPr lang="en-US" dirty="0" smtClean="0"/>
+              <a:t>e.g</a:t>
+            </a:r>
+            <a:r>
+              <a:rPr lang="en-US" dirty="0" smtClean="0"/>
+              <a:t>. </a:t>
+            </a:r>
+            <a:r>
+              <a:rPr lang="en-US" dirty="0" smtClean="0"/>
+              <a:t>the LED </a:t>
+            </a:r>
+            <a:r>
+              <a:rPr lang="en-US" dirty="0" smtClean="0"/>
+              <a:t>is changed, and hence the intensity with which you see it lighting.</a:t>
             </a:r>
           </a:p>
           <a:p>
@@ -13384,6 +13400,39 @@
           </a:p>
         </p:txBody>
       </p:sp>
+      <p:sp>
+        <p:nvSpPr>
+          <p:cNvPr id="14" name="Tekstvak 13"/>
+          <p:cNvSpPr txBox="1"/>
+          <p:nvPr/>
+        </p:nvSpPr>
+        <p:spPr>
+          <a:xfrm>
+            <a:off x="4499992" y="3867894"/>
+            <a:ext cx="432048" cy="138499"/>
+          </a:xfrm>
+          <a:prstGeom prst="rect">
+            <a:avLst/>
+          </a:prstGeom>
+          <a:solidFill>
+            <a:schemeClr val="bg1"/>
+          </a:solidFill>
+        </p:spPr>
+        <p:txBody>
+          <a:bodyPr wrap="square" lIns="0" tIns="0" rIns="0" bIns="0" rtlCol="0">
+            <a:spAutoFit/>
+          </a:bodyPr>
+          <a:lstStyle/>
+          <a:p>
+            <a:pPr algn="ctr"/>
+            <a:r>
+              <a:rPr lang="en-US" sz="900" b="1" dirty="0" smtClean="0"/>
+              <a:t>to pin 5</a:t>
+            </a:r>
+            <a:endParaRPr lang="nl-NL" sz="900" b="1" dirty="0"/>
+          </a:p>
+        </p:txBody>
+      </p:sp>
     </p:spTree>
   </p:cSld>
   <p:clrMapOvr>
@@ -14759,6 +14808,39 @@
               <a:t>Dark brown wire here</a:t>
             </a:r>
             <a:endParaRPr lang="nl-NL" dirty="0"/>
+          </a:p>
+        </p:txBody>
+      </p:sp>
+      <p:sp>
+        <p:nvSpPr>
+          <p:cNvPr id="19" name="Tekstvak 18"/>
+          <p:cNvSpPr txBox="1"/>
+          <p:nvPr/>
+        </p:nvSpPr>
+        <p:spPr>
+          <a:xfrm>
+            <a:off x="4499992" y="3867894"/>
+            <a:ext cx="432048" cy="138499"/>
+          </a:xfrm>
+          <a:prstGeom prst="rect">
+            <a:avLst/>
+          </a:prstGeom>
+          <a:solidFill>
+            <a:schemeClr val="bg1"/>
+          </a:solidFill>
+        </p:spPr>
+        <p:txBody>
+          <a:bodyPr wrap="square" lIns="0" tIns="0" rIns="0" bIns="0" rtlCol="0">
+            <a:spAutoFit/>
+          </a:bodyPr>
+          <a:lstStyle/>
+          <a:p>
+            <a:pPr algn="ctr"/>
+            <a:r>
+              <a:rPr lang="en-US" sz="900" b="1" dirty="0" smtClean="0"/>
+              <a:t>to pin 5</a:t>
+            </a:r>
+            <a:endParaRPr lang="nl-NL" sz="900" b="1" dirty="0"/>
           </a:p>
         </p:txBody>
       </p:sp>
@@ -16116,6 +16198,39 @@
           </a:p>
         </p:txBody>
       </p:sp>
+      <p:sp>
+        <p:nvSpPr>
+          <p:cNvPr id="19" name="Tekstvak 18"/>
+          <p:cNvSpPr txBox="1"/>
+          <p:nvPr/>
+        </p:nvSpPr>
+        <p:spPr>
+          <a:xfrm>
+            <a:off x="4499992" y="3867894"/>
+            <a:ext cx="432048" cy="138499"/>
+          </a:xfrm>
+          <a:prstGeom prst="rect">
+            <a:avLst/>
+          </a:prstGeom>
+          <a:solidFill>
+            <a:schemeClr val="bg1"/>
+          </a:solidFill>
+        </p:spPr>
+        <p:txBody>
+          <a:bodyPr wrap="square" lIns="0" tIns="0" rIns="0" bIns="0" rtlCol="0">
+            <a:spAutoFit/>
+          </a:bodyPr>
+          <a:lstStyle/>
+          <a:p>
+            <a:pPr algn="ctr"/>
+            <a:r>
+              <a:rPr lang="en-US" sz="900" b="1" dirty="0" smtClean="0"/>
+              <a:t>to pin 5</a:t>
+            </a:r>
+            <a:endParaRPr lang="nl-NL" sz="900" b="1" dirty="0"/>
+          </a:p>
+        </p:txBody>
+      </p:sp>
     </p:spTree>
   </p:cSld>
   <p:clrMapOvr>
@@ -16746,11 +16861,7 @@
             </a:r>
             <a:r>
               <a:rPr lang="en-US" dirty="0" smtClean="0"/>
-              <a:t> </a:t>
-            </a:r>
-            <a:r>
-              <a:rPr lang="en-US" dirty="0" smtClean="0"/>
-              <a:t>so that it sends messages to the sprite to turn the LED on and off</a:t>
+              <a:t> so that it sends messages to the sprite to turn the LED on and off</a:t>
             </a:r>
             <a:endParaRPr lang="nl-NL" dirty="0"/>
           </a:p>
@@ -16845,7 +16956,15 @@
           <a:p>
             <a:r>
               <a:rPr lang="en-US" dirty="0" smtClean="0"/>
-              <a:t>Same that you did with the Big Red LED sprite, but now for the Big Green LED sprite.</a:t>
+              <a:t>Same that you did with the </a:t>
+            </a:r>
+            <a:r>
+              <a:rPr lang="en-US" dirty="0" smtClean="0"/>
+              <a:t>Big Red LED </a:t>
+            </a:r>
+            <a:r>
+              <a:rPr lang="en-US" dirty="0" smtClean="0"/>
+              <a:t>sprite, but now for the Big Green LED sprite.</a:t>
             </a:r>
             <a:endParaRPr lang="nl-NL" dirty="0"/>
           </a:p>
@@ -27771,7 +27890,11 @@
             </a:r>
             <a:r>
               <a:rPr lang="en-US" dirty="0" smtClean="0"/>
-              <a:t> file again (</a:t>
+              <a:t> file again </a:t>
+            </a:r>
+            <a:r>
+              <a:rPr lang="en-US" dirty="0" smtClean="0"/>
+              <a:t>(right click </a:t>
             </a:r>
             <a:r>
               <a:rPr lang="en-US" i="1" dirty="0" smtClean="0"/>
@@ -27779,8 +27902,25 @@
             </a:r>
             <a:r>
               <a:rPr lang="en-US" dirty="0" smtClean="0"/>
-              <a:t> on the desktop)</a:t>
-            </a:r>
+              <a:t> </a:t>
+            </a:r>
+            <a:r>
+              <a:rPr lang="en-US" dirty="0" smtClean="0"/>
+              <a:t>on the </a:t>
+            </a:r>
+            <a:r>
+              <a:rPr lang="en-US" dirty="0" smtClean="0"/>
+              <a:t>desktop, </a:t>
+            </a:r>
+            <a:r>
+              <a:rPr lang="en-US" dirty="0" err="1" smtClean="0"/>
+              <a:t>scratchConfig</a:t>
+            </a:r>
+            <a:r>
+              <a:rPr lang="en-US" dirty="0" smtClean="0"/>
+              <a:t> Edit)</a:t>
+            </a:r>
+            <a:endParaRPr lang="en-US" dirty="0" smtClean="0"/>
           </a:p>
           <a:p>
             <a:pPr lvl="1"/>
@@ -27834,7 +27974,19 @@
             </a:r>
             <a:r>
               <a:rPr lang="en-US" dirty="0" smtClean="0"/>
-              <a:t>on pin 5 (direction: out, function: PWM)</a:t>
+              <a:t>on pin </a:t>
+            </a:r>
+            <a:r>
+              <a:rPr lang="en-US" dirty="0" smtClean="0"/>
+              <a:t>5</a:t>
+            </a:r>
+            <a:r>
+              <a:rPr lang="en-US" dirty="0" smtClean="0"/>
+              <a:t> </a:t>
+            </a:r>
+            <a:r>
+              <a:rPr lang="en-US" dirty="0" smtClean="0"/>
+              <a:t>(direction: out, function: PWM)</a:t>
             </a:r>
           </a:p>
           <a:p>
@@ -31406,7 +31558,17 @@
           <a:p>
             <a:r>
               <a:rPr lang="en-US" dirty="0" smtClean="0"/>
-              <a:t>Stop and restart </a:t>
+              <a:t>Reconnect and repower the board</a:t>
+            </a:r>
+          </a:p>
+          <a:p>
+            <a:r>
+              <a:rPr lang="en-US" dirty="0" smtClean="0"/>
+              <a:t>Stop </a:t>
+            </a:r>
+            <a:r>
+              <a:rPr lang="en-US" dirty="0" smtClean="0"/>
+              <a:t>and restart </a:t>
             </a:r>
             <a:r>
               <a:rPr lang="en-US" dirty="0" err="1" smtClean="0"/>
@@ -31428,13 +31590,11 @@
           <a:p>
             <a:r>
               <a:rPr lang="en-US" dirty="0" smtClean="0"/>
-              <a:t>Reconnect and repower the board</a:t>
-            </a:r>
-          </a:p>
-          <a:p>
-            <a:r>
-              <a:rPr lang="en-US" dirty="0" smtClean="0"/>
-              <a:t>Make this piece of program and run it</a:t>
+              <a:t>Make </a:t>
+            </a:r>
+            <a:r>
+              <a:rPr lang="en-US" dirty="0" smtClean="0"/>
+              <a:t>this piece of program and run it</a:t>
             </a:r>
           </a:p>
           <a:p>
@@ -31507,7 +31667,7 @@
         </p:blipFill>
         <p:spPr bwMode="auto">
           <a:xfrm>
-            <a:off x="5940152" y="1707654"/>
+            <a:off x="6732240" y="1707654"/>
             <a:ext cx="1314450" cy="1123950"/>
           </a:xfrm>
           <a:prstGeom prst="rect">
@@ -33283,7 +33443,7 @@
             <a:pPr algn="ctr"/>
             <a:r>
               <a:rPr lang="en-US" dirty="0" smtClean="0"/>
-              <a:t>Part 8: Pulse Width Modulation</a:t>
+              <a:t>Part 2: Pulse Width Modulation</a:t>
             </a:r>
             <a:endParaRPr lang="nl-NL" dirty="0"/>
           </a:p>

</xml_diff>